<commit_message>
Pptx updated + shifter scheme in Inkscape changed
</commit_message>
<xml_diff>
--- a/ASIC_hardware_blockLevelStructure.pptx
+++ b/ASIC_hardware_blockLevelStructure.pptx
@@ -214,7 +214,7 @@
           <a:p>
             <a:fld id="{49C78CC3-DFEA-A54D-97A6-ADF4A47AA041}" type="datetimeFigureOut">
               <a:rPr lang="en-ES" smtClean="0"/>
-              <a:t>8/8/21</a:t>
+              <a:t>10/8/21</a:t>
             </a:fld>
             <a:endParaRPr lang="en-ES"/>
           </a:p>
@@ -1185,7 +1185,7 @@
           <a:p>
             <a:fld id="{76969C88-B244-455D-A017-012B25B1ACDD}" type="datetimeFigureOut">
               <a:rPr lang="en-US" smtClean="0"/>
-              <a:t>8/8/21</a:t>
+              <a:t>8/10/21</a:t>
             </a:fld>
             <a:endParaRPr lang="en-US"/>
           </a:p>
@@ -1385,7 +1385,7 @@
           <a:p>
             <a:fld id="{76969C88-B244-455D-A017-012B25B1ACDD}" type="datetimeFigureOut">
               <a:rPr lang="en-US" smtClean="0"/>
-              <a:t>8/8/21</a:t>
+              <a:t>8/10/21</a:t>
             </a:fld>
             <a:endParaRPr lang="en-US"/>
           </a:p>
@@ -1595,7 +1595,7 @@
           <a:p>
             <a:fld id="{76969C88-B244-455D-A017-012B25B1ACDD}" type="datetimeFigureOut">
               <a:rPr lang="en-US" smtClean="0"/>
-              <a:t>8/8/21</a:t>
+              <a:t>8/10/21</a:t>
             </a:fld>
             <a:endParaRPr lang="en-US"/>
           </a:p>
@@ -1795,7 +1795,7 @@
           <a:p>
             <a:fld id="{76969C88-B244-455D-A017-012B25B1ACDD}" type="datetimeFigureOut">
               <a:rPr lang="en-US" smtClean="0"/>
-              <a:t>8/8/21</a:t>
+              <a:t>8/10/21</a:t>
             </a:fld>
             <a:endParaRPr lang="en-US"/>
           </a:p>
@@ -2071,7 +2071,7 @@
           <a:p>
             <a:fld id="{76969C88-B244-455D-A017-012B25B1ACDD}" type="datetimeFigureOut">
               <a:rPr lang="en-US" smtClean="0"/>
-              <a:t>8/8/21</a:t>
+              <a:t>8/10/21</a:t>
             </a:fld>
             <a:endParaRPr lang="en-US"/>
           </a:p>
@@ -2339,7 +2339,7 @@
           <a:p>
             <a:fld id="{76969C88-B244-455D-A017-012B25B1ACDD}" type="datetimeFigureOut">
               <a:rPr lang="en-US" smtClean="0"/>
-              <a:t>8/8/21</a:t>
+              <a:t>8/10/21</a:t>
             </a:fld>
             <a:endParaRPr lang="en-US"/>
           </a:p>
@@ -2754,7 +2754,7 @@
           <a:p>
             <a:fld id="{76969C88-B244-455D-A017-012B25B1ACDD}" type="datetimeFigureOut">
               <a:rPr lang="en-US" smtClean="0"/>
-              <a:t>8/8/21</a:t>
+              <a:t>8/10/21</a:t>
             </a:fld>
             <a:endParaRPr lang="en-US"/>
           </a:p>
@@ -2896,7 +2896,7 @@
           <a:p>
             <a:fld id="{76969C88-B244-455D-A017-012B25B1ACDD}" type="datetimeFigureOut">
               <a:rPr lang="en-US" smtClean="0"/>
-              <a:t>8/8/21</a:t>
+              <a:t>8/10/21</a:t>
             </a:fld>
             <a:endParaRPr lang="en-US"/>
           </a:p>
@@ -3009,7 +3009,7 @@
           <a:p>
             <a:fld id="{76969C88-B244-455D-A017-012B25B1ACDD}" type="datetimeFigureOut">
               <a:rPr lang="en-US" smtClean="0"/>
-              <a:t>8/8/21</a:t>
+              <a:t>8/10/21</a:t>
             </a:fld>
             <a:endParaRPr lang="en-US"/>
           </a:p>
@@ -3322,7 +3322,7 @@
           <a:p>
             <a:fld id="{76969C88-B244-455D-A017-012B25B1ACDD}" type="datetimeFigureOut">
               <a:rPr lang="en-US" smtClean="0"/>
-              <a:t>8/8/21</a:t>
+              <a:t>8/10/21</a:t>
             </a:fld>
             <a:endParaRPr lang="en-US"/>
           </a:p>
@@ -3611,7 +3611,7 @@
           <a:p>
             <a:fld id="{76969C88-B244-455D-A017-012B25B1ACDD}" type="datetimeFigureOut">
               <a:rPr lang="en-US" smtClean="0"/>
-              <a:t>8/8/21</a:t>
+              <a:t>8/10/21</a:t>
             </a:fld>
             <a:endParaRPr lang="en-US"/>
           </a:p>
@@ -3855,7 +3855,7 @@
             <a:fld id="{76969C88-B244-455D-A017-012B25B1ACDD}" type="datetimeFigureOut">
               <a:rPr lang="en-US" smtClean="0"/>
               <a:pPr/>
-              <a:t>8/8/21</a:t>
+              <a:t>8/10/21</a:t>
             </a:fld>
             <a:endParaRPr lang="en-US"/>
           </a:p>
@@ -26557,36 +26557,6 @@
           <a:chExt cx="0" cy="0"/>
         </a:xfrm>
       </p:grpSpPr>
-      <p:pic>
-        <p:nvPicPr>
-          <p:cNvPr id="4" name="Picture 3" descr="Chart&#10;&#10;Description automatically generated">
-            <a:extLst>
-              <a:ext uri="{FF2B5EF4-FFF2-40B4-BE49-F238E27FC236}">
-                <a16:creationId xmlns:a16="http://schemas.microsoft.com/office/drawing/2014/main" id="{B2780A5F-A686-454E-A79C-2819FF0A229B}"/>
-              </a:ext>
-            </a:extLst>
-          </p:cNvPr>
-          <p:cNvPicPr>
-            <a:picLocks noChangeAspect="1"/>
-          </p:cNvPicPr>
-          <p:nvPr/>
-        </p:nvPicPr>
-        <p:blipFill>
-          <a:blip r:embed="rId2"/>
-          <a:stretch>
-            <a:fillRect/>
-          </a:stretch>
-        </p:blipFill>
-        <p:spPr>
-          <a:xfrm>
-            <a:off x="1719977" y="673360"/>
-            <a:ext cx="8752045" cy="6184640"/>
-          </a:xfrm>
-          <a:prstGeom prst="rect">
-            <a:avLst/>
-          </a:prstGeom>
-        </p:spPr>
-      </p:pic>
       <p:sp>
         <p:nvSpPr>
           <p:cNvPr id="2" name="Title 1">
@@ -26616,6 +26586,36 @@
           </a:p>
         </p:txBody>
       </p:sp>
+      <p:pic>
+        <p:nvPicPr>
+          <p:cNvPr id="4" name="Picture 3" descr="Chart&#10;&#10;Description automatically generated">
+            <a:extLst>
+              <a:ext uri="{FF2B5EF4-FFF2-40B4-BE49-F238E27FC236}">
+                <a16:creationId xmlns:a16="http://schemas.microsoft.com/office/drawing/2014/main" id="{9E7F06C5-4384-F247-B0EE-BAA9FA66B30D}"/>
+              </a:ext>
+            </a:extLst>
+          </p:cNvPr>
+          <p:cNvPicPr>
+            <a:picLocks noChangeAspect="1"/>
+          </p:cNvPicPr>
+          <p:nvPr/>
+        </p:nvPicPr>
+        <p:blipFill>
+          <a:blip r:embed="rId2"/>
+          <a:stretch>
+            <a:fillRect/>
+          </a:stretch>
+        </p:blipFill>
+        <p:spPr>
+          <a:xfrm>
+            <a:off x="2383189" y="1610679"/>
+            <a:ext cx="7425621" cy="5247321"/>
+          </a:xfrm>
+          <a:prstGeom prst="rect">
+            <a:avLst/>
+          </a:prstGeom>
+        </p:spPr>
+      </p:pic>
     </p:spTree>
     <p:extLst>
       <p:ext uri="{BB962C8B-B14F-4D97-AF65-F5344CB8AC3E}">

</xml_diff>

<commit_message>
New drawings for ROM and reg + powerpoint updated
</commit_message>
<xml_diff>
--- a/ASIC_hardware_blockLevelStructure.pptx
+++ b/ASIC_hardware_blockLevelStructure.pptx
@@ -5,7 +5,7 @@
     <p:sldMasterId id="2147483700" r:id="rId1"/>
   </p:sldMasterIdLst>
   <p:notesMasterIdLst>
-    <p:notesMasterId r:id="rId24"/>
+    <p:notesMasterId r:id="rId22"/>
   </p:notesMasterIdLst>
   <p:sldIdLst>
     <p:sldId id="256" r:id="rId2"/>
@@ -18,18 +18,16 @@
     <p:sldId id="276" r:id="rId9"/>
     <p:sldId id="271" r:id="rId10"/>
     <p:sldId id="278" r:id="rId11"/>
-    <p:sldId id="277" r:id="rId12"/>
-    <p:sldId id="272" r:id="rId13"/>
-    <p:sldId id="263" r:id="rId14"/>
-    <p:sldId id="264" r:id="rId15"/>
-    <p:sldId id="261" r:id="rId16"/>
-    <p:sldId id="262" r:id="rId17"/>
-    <p:sldId id="267" r:id="rId18"/>
-    <p:sldId id="268" r:id="rId19"/>
-    <p:sldId id="269" r:id="rId20"/>
-    <p:sldId id="270" r:id="rId21"/>
-    <p:sldId id="265" r:id="rId22"/>
-    <p:sldId id="266" r:id="rId23"/>
+    <p:sldId id="263" r:id="rId12"/>
+    <p:sldId id="264" r:id="rId13"/>
+    <p:sldId id="261" r:id="rId14"/>
+    <p:sldId id="262" r:id="rId15"/>
+    <p:sldId id="267" r:id="rId16"/>
+    <p:sldId id="268" r:id="rId17"/>
+    <p:sldId id="269" r:id="rId18"/>
+    <p:sldId id="270" r:id="rId19"/>
+    <p:sldId id="265" r:id="rId20"/>
+    <p:sldId id="266" r:id="rId21"/>
   </p:sldIdLst>
   <p:sldSz cx="12192000" cy="6858000"/>
   <p:notesSz cx="6858000" cy="9144000"/>
@@ -218,7 +216,7 @@
           <a:p>
             <a:fld id="{49C78CC3-DFEA-A54D-97A6-ADF4A47AA041}" type="datetimeFigureOut">
               <a:rPr lang="en-ES" smtClean="0"/>
-              <a:t>15/8/21</a:t>
+              <a:t>18/8/21</a:t>
             </a:fld>
             <a:endParaRPr lang="en-ES"/>
           </a:p>
@@ -1046,171 +1044,6 @@
           <a:p>
             <a:r>
               <a:rPr lang="en-ES" dirty="0"/>
-              <a:t>Creating a ROM verilog: </a:t>
-            </a:r>
-          </a:p>
-          <a:p>
-            <a:pPr marL="171450" indent="-171450">
-              <a:buFont typeface="Arial" panose="020B0604020202020204" pitchFamily="34" charset="0"/>
-              <a:buChar char="•"/>
-            </a:pPr>
-            <a:r>
-              <a:rPr lang="en-GB" dirty="0"/>
-              <a:t>https://</a:t>
-            </a:r>
-            <a:r>
-              <a:rPr lang="en-GB" dirty="0" err="1"/>
-              <a:t>vlsiworld-asic.blogspot.com</a:t>
-            </a:r>
-            <a:r>
-              <a:rPr lang="en-GB" dirty="0"/>
-              <a:t>/2012/02/</a:t>
-            </a:r>
-            <a:r>
-              <a:rPr lang="en-GB" dirty="0" err="1"/>
-              <a:t>verilog</a:t>
-            </a:r>
-            <a:r>
-              <a:rPr lang="en-GB" dirty="0"/>
-              <a:t>-code-for-ram-</a:t>
-            </a:r>
-            <a:r>
-              <a:rPr lang="en-GB" dirty="0" err="1"/>
-              <a:t>rom.html</a:t>
-            </a:r>
-            <a:endParaRPr lang="en-GB" dirty="0"/>
-          </a:p>
-          <a:p>
-            <a:pPr marL="171450" indent="-171450">
-              <a:buFont typeface="Arial" panose="020B0604020202020204" pitchFamily="34" charset="0"/>
-              <a:buChar char="•"/>
-            </a:pPr>
-            <a:r>
-              <a:rPr lang="en-GB"/>
-              <a:t>https</a:t>
-            </a:r>
-            <a:r>
-              <a:rPr lang="en-GB" dirty="0"/>
-              <a:t>://</a:t>
-            </a:r>
-            <a:r>
-              <a:rPr lang="en-GB" dirty="0" err="1"/>
-              <a:t>github.com</a:t>
-            </a:r>
-            <a:r>
-              <a:rPr lang="en-GB" dirty="0"/>
-              <a:t>/</a:t>
-            </a:r>
-            <a:r>
-              <a:rPr lang="en-GB" dirty="0" err="1"/>
-              <a:t>Obijuan</a:t>
-            </a:r>
-            <a:r>
-              <a:rPr lang="en-GB" dirty="0"/>
-              <a:t>/open-</a:t>
-            </a:r>
-            <a:r>
-              <a:rPr lang="en-GB" dirty="0" err="1"/>
-              <a:t>fpga</a:t>
-            </a:r>
-            <a:r>
-              <a:rPr lang="en-GB" dirty="0"/>
-              <a:t>-</a:t>
-            </a:r>
-            <a:r>
-              <a:rPr lang="en-GB" dirty="0" err="1"/>
-              <a:t>verilog</a:t>
-            </a:r>
-            <a:r>
-              <a:rPr lang="en-GB" dirty="0"/>
-              <a:t>-tutorial/wiki/Cap%C3%ADtulo-26:-Memoria-ROM</a:t>
-            </a:r>
-            <a:endParaRPr lang="en-ES" dirty="0"/>
-          </a:p>
-        </p:txBody>
-      </p:sp>
-      <p:sp>
-        <p:nvSpPr>
-          <p:cNvPr id="4" name="Slide Number Placeholder 3"/>
-          <p:cNvSpPr>
-            <a:spLocks noGrp="1"/>
-          </p:cNvSpPr>
-          <p:nvPr>
-            <p:ph type="sldNum" sz="quarter" idx="5"/>
-          </p:nvPr>
-        </p:nvSpPr>
-        <p:spPr/>
-        <p:txBody>
-          <a:bodyPr/>
-          <a:lstStyle/>
-          <a:p>
-            <a:fld id="{99A03F45-CC4C-8641-8D32-38B5EE8AEF68}" type="slidenum">
-              <a:rPr lang="en-ES" smtClean="0"/>
-              <a:t>11</a:t>
-            </a:fld>
-            <a:endParaRPr lang="en-ES"/>
-          </a:p>
-        </p:txBody>
-      </p:sp>
-    </p:spTree>
-    <p:extLst>
-      <p:ext uri="{BB962C8B-B14F-4D97-AF65-F5344CB8AC3E}">
-        <p14:creationId xmlns:p14="http://schemas.microsoft.com/office/powerpoint/2010/main" val="762639556"/>
-      </p:ext>
-    </p:extLst>
-  </p:cSld>
-  <p:clrMapOvr>
-    <a:masterClrMapping/>
-  </p:clrMapOvr>
-</p:notes>
-</file>
-
-<file path=ppt/notesSlides/notesSlide6.xml><?xml version="1.0" encoding="utf-8"?>
-<p:notes xmlns:a="http://schemas.openxmlformats.org/drawingml/2006/main" xmlns:r="http://schemas.openxmlformats.org/officeDocument/2006/relationships" xmlns:p="http://schemas.openxmlformats.org/presentationml/2006/main">
-  <p:cSld>
-    <p:spTree>
-      <p:nvGrpSpPr>
-        <p:cNvPr id="1" name=""/>
-        <p:cNvGrpSpPr/>
-        <p:nvPr/>
-      </p:nvGrpSpPr>
-      <p:grpSpPr>
-        <a:xfrm>
-          <a:off x="0" y="0"/>
-          <a:ext cx="0" cy="0"/>
-          <a:chOff x="0" y="0"/>
-          <a:chExt cx="0" cy="0"/>
-        </a:xfrm>
-      </p:grpSpPr>
-      <p:sp>
-        <p:nvSpPr>
-          <p:cNvPr id="2" name="Slide Image Placeholder 1"/>
-          <p:cNvSpPr>
-            <a:spLocks noGrp="1" noRot="1" noChangeAspect="1"/>
-          </p:cNvSpPr>
-          <p:nvPr>
-            <p:ph type="sldImg"/>
-          </p:nvPr>
-        </p:nvSpPr>
-        <p:spPr/>
-      </p:sp>
-      <p:sp>
-        <p:nvSpPr>
-          <p:cNvPr id="3" name="Notes Placeholder 2"/>
-          <p:cNvSpPr>
-            <a:spLocks noGrp="1"/>
-          </p:cNvSpPr>
-          <p:nvPr>
-            <p:ph type="body" idx="1"/>
-          </p:nvPr>
-        </p:nvSpPr>
-        <p:spPr/>
-        <p:txBody>
-          <a:bodyPr/>
-          <a:lstStyle/>
-          <a:p>
-            <a:r>
-              <a:rPr lang="en-ES" dirty="0"/>
               <a:t>Doubt 1: The output for the XOR modules, having an input of two 8-bit numbers, will be 8-bit or 16-bit?</a:t>
             </a:r>
           </a:p>
@@ -1233,7 +1066,7 @@
           <a:p>
             <a:fld id="{99A03F45-CC4C-8641-8D32-38B5EE8AEF68}" type="slidenum">
               <a:rPr lang="en-ES" smtClean="0"/>
-              <a:t>18</a:t>
+              <a:t>16</a:t>
             </a:fld>
             <a:endParaRPr lang="en-ES"/>
           </a:p>
@@ -1252,7 +1085,7 @@
 </p:notes>
 </file>
 
-<file path=ppt/notesSlides/notesSlide7.xml><?xml version="1.0" encoding="utf-8"?>
+<file path=ppt/notesSlides/notesSlide6.xml><?xml version="1.0" encoding="utf-8"?>
 <p:notes xmlns:a="http://schemas.openxmlformats.org/drawingml/2006/main" xmlns:r="http://schemas.openxmlformats.org/officeDocument/2006/relationships" xmlns:p="http://schemas.openxmlformats.org/presentationml/2006/main">
   <p:cSld>
     <p:spTree>
@@ -1351,7 +1184,7 @@
           <a:p>
             <a:fld id="{99A03F45-CC4C-8641-8D32-38B5EE8AEF68}" type="slidenum">
               <a:rPr lang="en-ES" smtClean="0"/>
-              <a:t>19</a:t>
+              <a:t>17</a:t>
             </a:fld>
             <a:endParaRPr lang="en-ES"/>
           </a:p>
@@ -1370,7 +1203,7 @@
 </p:notes>
 </file>
 
-<file path=ppt/notesSlides/notesSlide8.xml><?xml version="1.0" encoding="utf-8"?>
+<file path=ppt/notesSlides/notesSlide7.xml><?xml version="1.0" encoding="utf-8"?>
 <p:notes xmlns:a="http://schemas.openxmlformats.org/drawingml/2006/main" xmlns:r="http://schemas.openxmlformats.org/officeDocument/2006/relationships" xmlns:p="http://schemas.openxmlformats.org/presentationml/2006/main">
   <p:cSld>
     <p:spTree>
@@ -1435,7 +1268,7 @@
           <a:p>
             <a:fld id="{99A03F45-CC4C-8641-8D32-38B5EE8AEF68}" type="slidenum">
               <a:rPr lang="en-ES" smtClean="0"/>
-              <a:t>20</a:t>
+              <a:t>18</a:t>
             </a:fld>
             <a:endParaRPr lang="en-ES"/>
           </a:p>
@@ -1603,7 +1436,7 @@
           <a:p>
             <a:fld id="{76969C88-B244-455D-A017-012B25B1ACDD}" type="datetimeFigureOut">
               <a:rPr lang="en-US" smtClean="0"/>
-              <a:t>8/15/21</a:t>
+              <a:t>8/18/21</a:t>
             </a:fld>
             <a:endParaRPr lang="en-US"/>
           </a:p>
@@ -1803,7 +1636,7 @@
           <a:p>
             <a:fld id="{76969C88-B244-455D-A017-012B25B1ACDD}" type="datetimeFigureOut">
               <a:rPr lang="en-US" smtClean="0"/>
-              <a:t>8/15/21</a:t>
+              <a:t>8/18/21</a:t>
             </a:fld>
             <a:endParaRPr lang="en-US"/>
           </a:p>
@@ -2013,7 +1846,7 @@
           <a:p>
             <a:fld id="{76969C88-B244-455D-A017-012B25B1ACDD}" type="datetimeFigureOut">
               <a:rPr lang="en-US" smtClean="0"/>
-              <a:t>8/15/21</a:t>
+              <a:t>8/18/21</a:t>
             </a:fld>
             <a:endParaRPr lang="en-US"/>
           </a:p>
@@ -2213,7 +2046,7 @@
           <a:p>
             <a:fld id="{76969C88-B244-455D-A017-012B25B1ACDD}" type="datetimeFigureOut">
               <a:rPr lang="en-US" smtClean="0"/>
-              <a:t>8/15/21</a:t>
+              <a:t>8/18/21</a:t>
             </a:fld>
             <a:endParaRPr lang="en-US"/>
           </a:p>
@@ -2489,7 +2322,7 @@
           <a:p>
             <a:fld id="{76969C88-B244-455D-A017-012B25B1ACDD}" type="datetimeFigureOut">
               <a:rPr lang="en-US" smtClean="0"/>
-              <a:t>8/15/21</a:t>
+              <a:t>8/18/21</a:t>
             </a:fld>
             <a:endParaRPr lang="en-US"/>
           </a:p>
@@ -2757,7 +2590,7 @@
           <a:p>
             <a:fld id="{76969C88-B244-455D-A017-012B25B1ACDD}" type="datetimeFigureOut">
               <a:rPr lang="en-US" smtClean="0"/>
-              <a:t>8/15/21</a:t>
+              <a:t>8/18/21</a:t>
             </a:fld>
             <a:endParaRPr lang="en-US"/>
           </a:p>
@@ -3172,7 +3005,7 @@
           <a:p>
             <a:fld id="{76969C88-B244-455D-A017-012B25B1ACDD}" type="datetimeFigureOut">
               <a:rPr lang="en-US" smtClean="0"/>
-              <a:t>8/15/21</a:t>
+              <a:t>8/18/21</a:t>
             </a:fld>
             <a:endParaRPr lang="en-US"/>
           </a:p>
@@ -3314,7 +3147,7 @@
           <a:p>
             <a:fld id="{76969C88-B244-455D-A017-012B25B1ACDD}" type="datetimeFigureOut">
               <a:rPr lang="en-US" smtClean="0"/>
-              <a:t>8/15/21</a:t>
+              <a:t>8/18/21</a:t>
             </a:fld>
             <a:endParaRPr lang="en-US"/>
           </a:p>
@@ -3427,7 +3260,7 @@
           <a:p>
             <a:fld id="{76969C88-B244-455D-A017-012B25B1ACDD}" type="datetimeFigureOut">
               <a:rPr lang="en-US" smtClean="0"/>
-              <a:t>8/15/21</a:t>
+              <a:t>8/18/21</a:t>
             </a:fld>
             <a:endParaRPr lang="en-US"/>
           </a:p>
@@ -3740,7 +3573,7 @@
           <a:p>
             <a:fld id="{76969C88-B244-455D-A017-012B25B1ACDD}" type="datetimeFigureOut">
               <a:rPr lang="en-US" smtClean="0"/>
-              <a:t>8/15/21</a:t>
+              <a:t>8/18/21</a:t>
             </a:fld>
             <a:endParaRPr lang="en-US"/>
           </a:p>
@@ -4029,7 +3862,7 @@
           <a:p>
             <a:fld id="{76969C88-B244-455D-A017-012B25B1ACDD}" type="datetimeFigureOut">
               <a:rPr lang="en-US" smtClean="0"/>
-              <a:t>8/15/21</a:t>
+              <a:t>8/18/21</a:t>
             </a:fld>
             <a:endParaRPr lang="en-US"/>
           </a:p>
@@ -4273,7 +4106,7 @@
             <a:fld id="{76969C88-B244-455D-A017-012B25B1ACDD}" type="datetimeFigureOut">
               <a:rPr lang="en-US" smtClean="0"/>
               <a:pPr/>
-              <a:t>8/15/21</a:t>
+              <a:t>8/18/21</a:t>
             </a:fld>
             <a:endParaRPr lang="en-US"/>
           </a:p>
@@ -4903,10 +4736,10 @@
       </p:sp>
       <p:pic>
         <p:nvPicPr>
-          <p:cNvPr id="4" name="Picture 3">
+          <p:cNvPr id="5" name="Picture 4">
             <a:extLst>
               <a:ext uri="{FF2B5EF4-FFF2-40B4-BE49-F238E27FC236}">
-                <a16:creationId xmlns:a16="http://schemas.microsoft.com/office/drawing/2014/main" id="{1CC4A3A3-0DC1-3049-8169-402A0B8B7DA0}"/>
+                <a16:creationId xmlns:a16="http://schemas.microsoft.com/office/drawing/2014/main" id="{6C7ACD7D-E410-FE40-961F-DD2D766E6A27}"/>
               </a:ext>
             </a:extLst>
           </p:cNvPr>
@@ -4923,37 +4756,7 @@
         </p:blipFill>
         <p:spPr>
           <a:xfrm>
-            <a:off x="850900" y="4758944"/>
-            <a:ext cx="10490200" cy="1498600"/>
-          </a:xfrm>
-          <a:prstGeom prst="rect">
-            <a:avLst/>
-          </a:prstGeom>
-        </p:spPr>
-      </p:pic>
-      <p:pic>
-        <p:nvPicPr>
-          <p:cNvPr id="5" name="Picture 4">
-            <a:extLst>
-              <a:ext uri="{FF2B5EF4-FFF2-40B4-BE49-F238E27FC236}">
-                <a16:creationId xmlns:a16="http://schemas.microsoft.com/office/drawing/2014/main" id="{6C7ACD7D-E410-FE40-961F-DD2D766E6A27}"/>
-              </a:ext>
-            </a:extLst>
-          </p:cNvPr>
-          <p:cNvPicPr>
-            <a:picLocks noChangeAspect="1"/>
-          </p:cNvPicPr>
-          <p:nvPr/>
-        </p:nvPicPr>
-        <p:blipFill>
-          <a:blip r:embed="rId4"/>
-          <a:stretch>
-            <a:fillRect/>
-          </a:stretch>
-        </p:blipFill>
-        <p:spPr>
-          <a:xfrm>
-            <a:off x="1428750" y="2411254"/>
+            <a:off x="1602004" y="2921393"/>
             <a:ext cx="9334500" cy="1460500"/>
           </a:xfrm>
           <a:prstGeom prst="rect">
@@ -4975,7 +4778,7 @@
         </p:nvSpPr>
         <p:spPr>
           <a:xfrm>
-            <a:off x="850900" y="1764951"/>
+            <a:off x="1024154" y="2275090"/>
             <a:ext cx="3063240" cy="369332"/>
           </a:xfrm>
           <a:prstGeom prst="rect">
@@ -4997,46 +4800,6 @@
             <a:r>
               <a:rPr lang="en-ES" dirty="0"/>
               <a:t>ROM v1.0 (reading from file)</a:t>
-            </a:r>
-          </a:p>
-        </p:txBody>
-      </p:sp>
-      <p:sp>
-        <p:nvSpPr>
-          <p:cNvPr id="7" name="TextBox 6">
-            <a:extLst>
-              <a:ext uri="{FF2B5EF4-FFF2-40B4-BE49-F238E27FC236}">
-                <a16:creationId xmlns:a16="http://schemas.microsoft.com/office/drawing/2014/main" id="{289C0498-AC82-A648-972F-BAF8F7F457D5}"/>
-              </a:ext>
-            </a:extLst>
-          </p:cNvPr>
-          <p:cNvSpPr txBox="1"/>
-          <p:nvPr/>
-        </p:nvSpPr>
-        <p:spPr>
-          <a:xfrm>
-            <a:off x="838200" y="4184198"/>
-            <a:ext cx="3368040" cy="369332"/>
-          </a:xfrm>
-          <a:prstGeom prst="rect">
-            <a:avLst/>
-          </a:prstGeom>
-          <a:noFill/>
-          <a:ln>
-            <a:solidFill>
-              <a:schemeClr val="accent1"/>
-            </a:solidFill>
-          </a:ln>
-        </p:spPr>
-        <p:txBody>
-          <a:bodyPr wrap="square" rtlCol="0">
-            <a:spAutoFit/>
-          </a:bodyPr>
-          <a:lstStyle/>
-          <a:p>
-            <a:r>
-              <a:rPr lang="en-ES" dirty="0"/>
-              <a:t>ROM v2.0 (hardcoded Sbox table)</a:t>
             </a:r>
           </a:p>
         </p:txBody>
@@ -5055,178 +4818,6 @@
 </file>
 
 <file path=ppt/slides/slide11.xml><?xml version="1.0" encoding="utf-8"?>
-<p:sld xmlns:a="http://schemas.openxmlformats.org/drawingml/2006/main" xmlns:r="http://schemas.openxmlformats.org/officeDocument/2006/relationships" xmlns:p="http://schemas.openxmlformats.org/presentationml/2006/main">
-  <p:cSld>
-    <p:spTree>
-      <p:nvGrpSpPr>
-        <p:cNvPr id="1" name=""/>
-        <p:cNvGrpSpPr/>
-        <p:nvPr/>
-      </p:nvGrpSpPr>
-      <p:grpSpPr>
-        <a:xfrm>
-          <a:off x="0" y="0"/>
-          <a:ext cx="0" cy="0"/>
-          <a:chOff x="0" y="0"/>
-          <a:chExt cx="0" cy="0"/>
-        </a:xfrm>
-      </p:grpSpPr>
-      <p:sp>
-        <p:nvSpPr>
-          <p:cNvPr id="2" name="Title 1">
-            <a:extLst>
-              <a:ext uri="{FF2B5EF4-FFF2-40B4-BE49-F238E27FC236}">
-                <a16:creationId xmlns:a16="http://schemas.microsoft.com/office/drawing/2014/main" id="{DE2A2D3A-38F7-924F-A6F6-C216F3169A4E}"/>
-              </a:ext>
-            </a:extLst>
-          </p:cNvPr>
-          <p:cNvSpPr>
-            <a:spLocks noGrp="1"/>
-          </p:cNvSpPr>
-          <p:nvPr>
-            <p:ph type="title"/>
-          </p:nvPr>
-        </p:nvSpPr>
-        <p:spPr/>
-        <p:txBody>
-          <a:bodyPr/>
-          <a:lstStyle/>
-          <a:p>
-            <a:pPr algn="ctr"/>
-            <a:r>
-              <a:rPr lang="en-ES" dirty="0"/>
-              <a:t>Substitution (module, enc &amp; keygen)</a:t>
-            </a:r>
-          </a:p>
-        </p:txBody>
-      </p:sp>
-      <p:sp>
-        <p:nvSpPr>
-          <p:cNvPr id="3" name="Content Placeholder 2">
-            <a:extLst>
-              <a:ext uri="{FF2B5EF4-FFF2-40B4-BE49-F238E27FC236}">
-                <a16:creationId xmlns:a16="http://schemas.microsoft.com/office/drawing/2014/main" id="{B8228337-7EEA-4248-B5AE-AE67E1E1F152}"/>
-              </a:ext>
-            </a:extLst>
-          </p:cNvPr>
-          <p:cNvSpPr>
-            <a:spLocks noGrp="1"/>
-          </p:cNvSpPr>
-          <p:nvPr>
-            <p:ph idx="1"/>
-          </p:nvPr>
-        </p:nvSpPr>
-        <p:spPr/>
-        <p:txBody>
-          <a:bodyPr/>
-          <a:lstStyle/>
-          <a:p>
-            <a:endParaRPr lang="en-ES"/>
-          </a:p>
-        </p:txBody>
-      </p:sp>
-    </p:spTree>
-    <p:extLst>
-      <p:ext uri="{BB962C8B-B14F-4D97-AF65-F5344CB8AC3E}">
-        <p14:creationId xmlns:p14="http://schemas.microsoft.com/office/powerpoint/2010/main" val="1066385574"/>
-      </p:ext>
-    </p:extLst>
-  </p:cSld>
-  <p:clrMapOvr>
-    <a:masterClrMapping/>
-  </p:clrMapOvr>
-</p:sld>
-</file>
-
-<file path=ppt/slides/slide12.xml><?xml version="1.0" encoding="utf-8"?>
-<p:sld xmlns:a="http://schemas.openxmlformats.org/drawingml/2006/main" xmlns:r="http://schemas.openxmlformats.org/officeDocument/2006/relationships" xmlns:p="http://schemas.openxmlformats.org/presentationml/2006/main">
-  <p:cSld>
-    <p:spTree>
-      <p:nvGrpSpPr>
-        <p:cNvPr id="1" name=""/>
-        <p:cNvGrpSpPr/>
-        <p:nvPr/>
-      </p:nvGrpSpPr>
-      <p:grpSpPr>
-        <a:xfrm>
-          <a:off x="0" y="0"/>
-          <a:ext cx="0" cy="0"/>
-          <a:chOff x="0" y="0"/>
-          <a:chExt cx="0" cy="0"/>
-        </a:xfrm>
-      </p:grpSpPr>
-      <p:sp>
-        <p:nvSpPr>
-          <p:cNvPr id="2" name="Title 1">
-            <a:extLst>
-              <a:ext uri="{FF2B5EF4-FFF2-40B4-BE49-F238E27FC236}">
-                <a16:creationId xmlns:a16="http://schemas.microsoft.com/office/drawing/2014/main" id="{D8FA3B43-EFAC-114B-AAF8-0D9B06DC0A74}"/>
-              </a:ext>
-            </a:extLst>
-          </p:cNvPr>
-          <p:cNvSpPr>
-            <a:spLocks noGrp="1"/>
-          </p:cNvSpPr>
-          <p:nvPr>
-            <p:ph type="title"/>
-          </p:nvPr>
-        </p:nvSpPr>
-        <p:spPr/>
-        <p:txBody>
-          <a:bodyPr/>
-          <a:lstStyle/>
-          <a:p>
-            <a:pPr algn="ctr"/>
-            <a:r>
-              <a:rPr lang="en-GB" dirty="0"/>
-              <a:t>t</a:t>
-            </a:r>
-            <a:r>
-              <a:rPr lang="en-ES" dirty="0"/>
-              <a:t>b: SUCCESSFUL</a:t>
-            </a:r>
-          </a:p>
-        </p:txBody>
-      </p:sp>
-      <p:sp>
-        <p:nvSpPr>
-          <p:cNvPr id="3" name="Content Placeholder 2">
-            <a:extLst>
-              <a:ext uri="{FF2B5EF4-FFF2-40B4-BE49-F238E27FC236}">
-                <a16:creationId xmlns:a16="http://schemas.microsoft.com/office/drawing/2014/main" id="{BB75D145-0C92-C64A-8DFB-3EF1E1BD9D43}"/>
-              </a:ext>
-            </a:extLst>
-          </p:cNvPr>
-          <p:cNvSpPr>
-            <a:spLocks noGrp="1"/>
-          </p:cNvSpPr>
-          <p:nvPr>
-            <p:ph idx="1"/>
-          </p:nvPr>
-        </p:nvSpPr>
-        <p:spPr/>
-        <p:txBody>
-          <a:bodyPr/>
-          <a:lstStyle/>
-          <a:p>
-            <a:endParaRPr lang="en-ES"/>
-          </a:p>
-        </p:txBody>
-      </p:sp>
-    </p:spTree>
-    <p:extLst>
-      <p:ext uri="{BB962C8B-B14F-4D97-AF65-F5344CB8AC3E}">
-        <p14:creationId xmlns:p14="http://schemas.microsoft.com/office/powerpoint/2010/main" val="980712982"/>
-      </p:ext>
-    </p:extLst>
-  </p:cSld>
-  <p:clrMapOvr>
-    <a:masterClrMapping/>
-  </p:clrMapOvr>
-</p:sld>
-</file>
-
-<file path=ppt/slides/slide13.xml><?xml version="1.0" encoding="utf-8"?>
 <p:sld xmlns:a="http://schemas.openxmlformats.org/drawingml/2006/main" xmlns:r="http://schemas.openxmlformats.org/officeDocument/2006/relationships" xmlns:p="http://schemas.openxmlformats.org/presentationml/2006/main">
   <p:cSld>
     <p:spTree>
@@ -5286,16 +4877,15 @@
           </p:cNvPicPr>
           <p:nvPr/>
         </p:nvPicPr>
-        <p:blipFill>
+        <p:blipFill rotWithShape="1">
           <a:blip r:embed="rId2"/>
-          <a:stretch>
-            <a:fillRect/>
-          </a:stretch>
+          <a:srcRect t="14978" b="11649"/>
+          <a:stretch/>
         </p:blipFill>
         <p:spPr>
           <a:xfrm>
-            <a:off x="2383189" y="1610679"/>
-            <a:ext cx="7425621" cy="5247321"/>
+            <a:off x="2383189" y="1886552"/>
+            <a:ext cx="7425621" cy="3850105"/>
           </a:xfrm>
           <a:prstGeom prst="rect">
             <a:avLst/>
@@ -5315,7 +4905,7 @@
 </p:sld>
 </file>
 
-<file path=ppt/slides/slide14.xml><?xml version="1.0" encoding="utf-8"?>
+<file path=ppt/slides/slide12.xml><?xml version="1.0" encoding="utf-8"?>
 <p:sld xmlns:a="http://schemas.openxmlformats.org/drawingml/2006/main" xmlns:r="http://schemas.openxmlformats.org/officeDocument/2006/relationships" xmlns:p="http://schemas.openxmlformats.org/presentationml/2006/main">
   <p:cSld>
     <p:spTree>
@@ -6813,7 +6403,7 @@
 </p:sld>
 </file>
 
-<file path=ppt/slides/slide15.xml><?xml version="1.0" encoding="utf-8"?>
+<file path=ppt/slides/slide13.xml><?xml version="1.0" encoding="utf-8"?>
 <p:sld xmlns:a="http://schemas.openxmlformats.org/drawingml/2006/main" xmlns:r="http://schemas.openxmlformats.org/officeDocument/2006/relationships" xmlns:p="http://schemas.openxmlformats.org/presentationml/2006/main">
   <p:cSld>
     <p:spTree>
@@ -9563,7 +9153,7 @@
 </p:sld>
 </file>
 
-<file path=ppt/slides/slide16.xml><?xml version="1.0" encoding="utf-8"?>
+<file path=ppt/slides/slide14.xml><?xml version="1.0" encoding="utf-8"?>
 <p:sld xmlns:a="http://schemas.openxmlformats.org/drawingml/2006/main" xmlns:r="http://schemas.openxmlformats.org/officeDocument/2006/relationships" xmlns:p="http://schemas.openxmlformats.org/presentationml/2006/main">
   <p:cSld>
     <p:spTree>
@@ -12909,7 +12499,7 @@
 </p:sld>
 </file>
 
-<file path=ppt/slides/slide17.xml><?xml version="1.0" encoding="utf-8"?>
+<file path=ppt/slides/slide15.xml><?xml version="1.0" encoding="utf-8"?>
 <p:sld xmlns:a="http://schemas.openxmlformats.org/drawingml/2006/main" xmlns:r="http://schemas.openxmlformats.org/officeDocument/2006/relationships" xmlns:p="http://schemas.openxmlformats.org/presentationml/2006/main">
   <p:cSld>
     <p:spTree>
@@ -12972,7 +12562,7 @@
 </p:sld>
 </file>
 
-<file path=ppt/slides/slide18.xml><?xml version="1.0" encoding="utf-8"?>
+<file path=ppt/slides/slide16.xml><?xml version="1.0" encoding="utf-8"?>
 <p:sld xmlns:a="http://schemas.openxmlformats.org/drawingml/2006/main" xmlns:r="http://schemas.openxmlformats.org/officeDocument/2006/relationships" xmlns:p="http://schemas.openxmlformats.org/presentationml/2006/main">
   <p:cSld>
     <p:spTree>
@@ -21388,7 +20978,7 @@
 </p:sld>
 </file>
 
-<file path=ppt/slides/slide19.xml><?xml version="1.0" encoding="utf-8"?>
+<file path=ppt/slides/slide17.xml><?xml version="1.0" encoding="utf-8"?>
 <p:sld xmlns:a="http://schemas.openxmlformats.org/drawingml/2006/main" xmlns:r="http://schemas.openxmlformats.org/officeDocument/2006/relationships" xmlns:p="http://schemas.openxmlformats.org/presentationml/2006/main">
   <p:cSld>
     <p:spTree>
@@ -22562,71 +22152,7 @@
 </p:sld>
 </file>
 
-<file path=ppt/slides/slide2.xml><?xml version="1.0" encoding="utf-8"?>
-<p:sld xmlns:a="http://schemas.openxmlformats.org/drawingml/2006/main" xmlns:r="http://schemas.openxmlformats.org/officeDocument/2006/relationships" xmlns:p="http://schemas.openxmlformats.org/presentationml/2006/main">
-  <p:cSld>
-    <p:spTree>
-      <p:nvGrpSpPr>
-        <p:cNvPr id="1" name=""/>
-        <p:cNvGrpSpPr/>
-        <p:nvPr/>
-      </p:nvGrpSpPr>
-      <p:grpSpPr>
-        <a:xfrm>
-          <a:off x="0" y="0"/>
-          <a:ext cx="0" cy="0"/>
-          <a:chOff x="0" y="0"/>
-          <a:chExt cx="0" cy="0"/>
-        </a:xfrm>
-      </p:grpSpPr>
-      <p:sp>
-        <p:nvSpPr>
-          <p:cNvPr id="2" name="Title 1">
-            <a:extLst>
-              <a:ext uri="{FF2B5EF4-FFF2-40B4-BE49-F238E27FC236}">
-                <a16:creationId xmlns:a16="http://schemas.microsoft.com/office/drawing/2014/main" id="{F04B7868-4E6E-5A46-86C0-41925A37830E}"/>
-              </a:ext>
-            </a:extLst>
-          </p:cNvPr>
-          <p:cNvSpPr>
-            <a:spLocks noGrp="1"/>
-          </p:cNvSpPr>
-          <p:nvPr>
-            <p:ph type="title"/>
-          </p:nvPr>
-        </p:nvSpPr>
-        <p:spPr>
-          <a:xfrm>
-            <a:off x="762000" y="2667000"/>
-            <a:ext cx="10668000" cy="1524000"/>
-          </a:xfrm>
-        </p:spPr>
-        <p:txBody>
-          <a:bodyPr/>
-          <a:lstStyle/>
-          <a:p>
-            <a:pPr algn="ctr"/>
-            <a:r>
-              <a:rPr lang="en-ES" dirty="0"/>
-              <a:t>AES algorithm’s steps</a:t>
-            </a:r>
-          </a:p>
-        </p:txBody>
-      </p:sp>
-    </p:spTree>
-    <p:extLst>
-      <p:ext uri="{BB962C8B-B14F-4D97-AF65-F5344CB8AC3E}">
-        <p14:creationId xmlns:p14="http://schemas.microsoft.com/office/powerpoint/2010/main" val="3818424290"/>
-      </p:ext>
-    </p:extLst>
-  </p:cSld>
-  <p:clrMapOvr>
-    <a:masterClrMapping/>
-  </p:clrMapOvr>
-</p:sld>
-</file>
-
-<file path=ppt/slides/slide20.xml><?xml version="1.0" encoding="utf-8"?>
+<file path=ppt/slides/slide18.xml><?xml version="1.0" encoding="utf-8"?>
 <p:sld xmlns:a="http://schemas.openxmlformats.org/drawingml/2006/main" xmlns:r="http://schemas.openxmlformats.org/officeDocument/2006/relationships" xmlns:p="http://schemas.openxmlformats.org/presentationml/2006/main">
   <p:cSld>
     <p:spTree>
@@ -22834,7 +22360,7 @@
 </p:sld>
 </file>
 
-<file path=ppt/slides/slide21.xml><?xml version="1.0" encoding="utf-8"?>
+<file path=ppt/slides/slide19.xml><?xml version="1.0" encoding="utf-8"?>
 <p:sld xmlns:a="http://schemas.openxmlformats.org/drawingml/2006/main" xmlns:r="http://schemas.openxmlformats.org/officeDocument/2006/relationships" xmlns:p="http://schemas.openxmlformats.org/presentationml/2006/main">
   <p:cSld>
     <p:spTree>
@@ -22928,7 +22454,71 @@
 </p:sld>
 </file>
 
-<file path=ppt/slides/slide22.xml><?xml version="1.0" encoding="utf-8"?>
+<file path=ppt/slides/slide2.xml><?xml version="1.0" encoding="utf-8"?>
+<p:sld xmlns:a="http://schemas.openxmlformats.org/drawingml/2006/main" xmlns:r="http://schemas.openxmlformats.org/officeDocument/2006/relationships" xmlns:p="http://schemas.openxmlformats.org/presentationml/2006/main">
+  <p:cSld>
+    <p:spTree>
+      <p:nvGrpSpPr>
+        <p:cNvPr id="1" name=""/>
+        <p:cNvGrpSpPr/>
+        <p:nvPr/>
+      </p:nvGrpSpPr>
+      <p:grpSpPr>
+        <a:xfrm>
+          <a:off x="0" y="0"/>
+          <a:ext cx="0" cy="0"/>
+          <a:chOff x="0" y="0"/>
+          <a:chExt cx="0" cy="0"/>
+        </a:xfrm>
+      </p:grpSpPr>
+      <p:sp>
+        <p:nvSpPr>
+          <p:cNvPr id="2" name="Title 1">
+            <a:extLst>
+              <a:ext uri="{FF2B5EF4-FFF2-40B4-BE49-F238E27FC236}">
+                <a16:creationId xmlns:a16="http://schemas.microsoft.com/office/drawing/2014/main" id="{F04B7868-4E6E-5A46-86C0-41925A37830E}"/>
+              </a:ext>
+            </a:extLst>
+          </p:cNvPr>
+          <p:cNvSpPr>
+            <a:spLocks noGrp="1"/>
+          </p:cNvSpPr>
+          <p:nvPr>
+            <p:ph type="title"/>
+          </p:nvPr>
+        </p:nvSpPr>
+        <p:spPr>
+          <a:xfrm>
+            <a:off x="762000" y="2667000"/>
+            <a:ext cx="10668000" cy="1524000"/>
+          </a:xfrm>
+        </p:spPr>
+        <p:txBody>
+          <a:bodyPr/>
+          <a:lstStyle/>
+          <a:p>
+            <a:pPr algn="ctr"/>
+            <a:r>
+              <a:rPr lang="en-ES" dirty="0"/>
+              <a:t>AES algorithm’s steps</a:t>
+            </a:r>
+          </a:p>
+        </p:txBody>
+      </p:sp>
+    </p:spTree>
+    <p:extLst>
+      <p:ext uri="{BB962C8B-B14F-4D97-AF65-F5344CB8AC3E}">
+        <p14:creationId xmlns:p14="http://schemas.microsoft.com/office/powerpoint/2010/main" val="3818424290"/>
+      </p:ext>
+    </p:extLst>
+  </p:cSld>
+  <p:clrMapOvr>
+    <a:masterClrMapping/>
+  </p:clrMapOvr>
+</p:sld>
+</file>
+
+<file path=ppt/slides/slide20.xml><?xml version="1.0" encoding="utf-8"?>
 <p:sld xmlns:a="http://schemas.openxmlformats.org/drawingml/2006/main" xmlns:r="http://schemas.openxmlformats.org/officeDocument/2006/relationships" xmlns:p="http://schemas.openxmlformats.org/presentationml/2006/main">
   <p:cSld>
     <p:spTree>
@@ -27577,11 +27167,40 @@
             <a:pPr algn="ctr"/>
             <a:r>
               <a:rPr lang="en-ES" dirty="0"/>
-              <a:t>16-bit register</a:t>
+              <a:t>16-byte register</a:t>
             </a:r>
           </a:p>
         </p:txBody>
       </p:sp>
+      <p:pic>
+        <p:nvPicPr>
+          <p:cNvPr id="4" name="Picture 3" descr="Diagram&#10;&#10;Description automatically generated">
+            <a:extLst>
+              <a:ext uri="{FF2B5EF4-FFF2-40B4-BE49-F238E27FC236}">
+                <a16:creationId xmlns:a16="http://schemas.microsoft.com/office/drawing/2014/main" id="{F37B9F55-B261-7545-AF79-BF7808B803DD}"/>
+              </a:ext>
+            </a:extLst>
+          </p:cNvPr>
+          <p:cNvPicPr>
+            <a:picLocks noChangeAspect="1"/>
+          </p:cNvPicPr>
+          <p:nvPr/>
+        </p:nvPicPr>
+        <p:blipFill rotWithShape="1">
+          <a:blip r:embed="rId3"/>
+          <a:srcRect l="17833" t="30035" r="16410" b="29404"/>
+          <a:stretch/>
+        </p:blipFill>
+        <p:spPr>
+          <a:xfrm>
+            <a:off x="2905225" y="2038149"/>
+            <a:ext cx="6381550" cy="2781701"/>
+          </a:xfrm>
+          <a:prstGeom prst="rect">
+            <a:avLst/>
+          </a:prstGeom>
+        </p:spPr>
+      </p:pic>
     </p:spTree>
     <p:extLst>
       <p:ext uri="{BB962C8B-B14F-4D97-AF65-F5344CB8AC3E}">
@@ -27730,31 +27349,35 @@
           </a:p>
         </p:txBody>
       </p:sp>
-      <p:sp>
-        <p:nvSpPr>
-          <p:cNvPr id="3" name="Content Placeholder 2">
+      <p:pic>
+        <p:nvPicPr>
+          <p:cNvPr id="5" name="Picture 4" descr="Diagram&#10;&#10;Description automatically generated">
             <a:extLst>
               <a:ext uri="{FF2B5EF4-FFF2-40B4-BE49-F238E27FC236}">
-                <a16:creationId xmlns:a16="http://schemas.microsoft.com/office/drawing/2014/main" id="{B8228337-7EEA-4248-B5AE-AE67E1E1F152}"/>
+                <a16:creationId xmlns:a16="http://schemas.microsoft.com/office/drawing/2014/main" id="{FC27BCC1-7581-AF45-A6AB-08D550857C95}"/>
               </a:ext>
             </a:extLst>
           </p:cNvPr>
-          <p:cNvSpPr>
-            <a:spLocks noGrp="1"/>
-          </p:cNvSpPr>
-          <p:nvPr>
-            <p:ph idx="1"/>
-          </p:nvPr>
-        </p:nvSpPr>
-        <p:spPr/>
-        <p:txBody>
-          <a:bodyPr/>
-          <a:lstStyle/>
-          <a:p>
-            <a:endParaRPr lang="en-ES"/>
-          </a:p>
-        </p:txBody>
-      </p:sp>
+          <p:cNvPicPr>
+            <a:picLocks noChangeAspect="1"/>
+          </p:cNvPicPr>
+          <p:nvPr/>
+        </p:nvPicPr>
+        <p:blipFill rotWithShape="1">
+          <a:blip r:embed="rId3"/>
+          <a:srcRect l="29139" t="16842" r="28511" b="31789"/>
+          <a:stretch/>
+        </p:blipFill>
+        <p:spPr>
+          <a:xfrm>
+            <a:off x="4041005" y="1925053"/>
+            <a:ext cx="4109989" cy="3522846"/>
+          </a:xfrm>
+          <a:prstGeom prst="rect">
+            <a:avLst/>
+          </a:prstGeom>
+        </p:spPr>
+      </p:pic>
     </p:spTree>
     <p:extLst>
       <p:ext uri="{BB962C8B-B14F-4D97-AF65-F5344CB8AC3E}">

</xml_diff>